<commit_message>
Reworked section 3. Added open set figure.
</commit_message>
<xml_diff>
--- a/img/classificationFrocFootball.pptx
+++ b/img/classificationFrocFootball.pptx
@@ -3983,7 +3983,7 @@
           <c:spPr>
             <a:ln w="12700">
               <a:solidFill>
-                <a:srgbClr val="00B050"/>
+                <a:srgbClr val="813FB7"/>
               </a:solidFill>
             </a:ln>
           </c:spPr>
@@ -4612,11 +4612,11 @@
           <c:showPercent val="0"/>
           <c:showBubbleSize val="0"/>
         </c:dLbls>
-        <c:axId val="75300864"/>
-        <c:axId val="75302016"/>
+        <c:axId val="59807360"/>
+        <c:axId val="64242816"/>
       </c:scatterChart>
       <c:valAx>
-        <c:axId val="75300864"/>
+        <c:axId val="59807360"/>
         <c:scaling>
           <c:logBase val="10"/>
           <c:orientation val="minMax"/>
@@ -4710,12 +4710,12 @@
             <a:endParaRPr lang="de-DE"/>
           </a:p>
         </c:txPr>
-        <c:crossAx val="75302016"/>
+        <c:crossAx val="64242816"/>
         <c:crosses val="autoZero"/>
         <c:crossBetween val="midCat"/>
       </c:valAx>
       <c:valAx>
-        <c:axId val="75302016"/>
+        <c:axId val="64242816"/>
         <c:scaling>
           <c:orientation val="minMax"/>
           <c:max val="0.70000000000000007"/>
@@ -4792,7 +4792,7 @@
             <a:endParaRPr lang="de-DE"/>
           </a:p>
         </c:txPr>
-        <c:crossAx val="75300864"/>
+        <c:crossAx val="59807360"/>
         <c:crossesAt val="1.0000000000000002E-3"/>
         <c:crossBetween val="midCat"/>
       </c:valAx>
@@ -6394,11 +6394,11 @@
           <c:showPercent val="0"/>
           <c:showBubbleSize val="0"/>
         </c:dLbls>
-        <c:axId val="43595392"/>
-        <c:axId val="43595968"/>
+        <c:axId val="60200576"/>
+        <c:axId val="64241664"/>
       </c:scatterChart>
       <c:valAx>
-        <c:axId val="43595392"/>
+        <c:axId val="60200576"/>
         <c:scaling>
           <c:logBase val="10"/>
           <c:orientation val="minMax"/>
@@ -6485,12 +6485,12 @@
             <a:endParaRPr lang="de-DE"/>
           </a:p>
         </c:txPr>
-        <c:crossAx val="43595968"/>
+        <c:crossAx val="64241664"/>
         <c:crosses val="autoZero"/>
         <c:crossBetween val="midCat"/>
       </c:valAx>
       <c:valAx>
-        <c:axId val="43595968"/>
+        <c:axId val="64241664"/>
         <c:scaling>
           <c:orientation val="minMax"/>
           <c:max val="1"/>
@@ -6567,7 +6567,7 @@
             <a:endParaRPr lang="de-DE"/>
           </a:p>
         </c:txPr>
-        <c:crossAx val="43595392"/>
+        <c:crossAx val="60200576"/>
         <c:crossesAt val="1.0000000000000002E-3"/>
         <c:crossBetween val="midCat"/>
       </c:valAx>
@@ -6816,7 +6816,7 @@
           <a:p>
             <a:fld id="{1BA50D42-C9CD-4801-B293-61D1F53EC57E}" type="datetimeFigureOut">
               <a:rPr lang="de-DE" smtClean="0"/>
-              <a:t>05.09.2017</a:t>
+              <a:t>06.09.2017</a:t>
             </a:fld>
             <a:endParaRPr lang="de-DE"/>
           </a:p>
@@ -6981,7 +6981,7 @@
           <a:p>
             <a:fld id="{1BA50D42-C9CD-4801-B293-61D1F53EC57E}" type="datetimeFigureOut">
               <a:rPr lang="de-DE" smtClean="0"/>
-              <a:t>05.09.2017</a:t>
+              <a:t>06.09.2017</a:t>
             </a:fld>
             <a:endParaRPr lang="de-DE"/>
           </a:p>
@@ -7156,7 +7156,7 @@
           <a:p>
             <a:fld id="{1BA50D42-C9CD-4801-B293-61D1F53EC57E}" type="datetimeFigureOut">
               <a:rPr lang="de-DE" smtClean="0"/>
-              <a:t>05.09.2017</a:t>
+              <a:t>06.09.2017</a:t>
             </a:fld>
             <a:endParaRPr lang="de-DE"/>
           </a:p>
@@ -7321,7 +7321,7 @@
           <a:p>
             <a:fld id="{1BA50D42-C9CD-4801-B293-61D1F53EC57E}" type="datetimeFigureOut">
               <a:rPr lang="de-DE" smtClean="0"/>
-              <a:t>05.09.2017</a:t>
+              <a:t>06.09.2017</a:t>
             </a:fld>
             <a:endParaRPr lang="de-DE"/>
           </a:p>
@@ -7562,7 +7562,7 @@
           <a:p>
             <a:fld id="{1BA50D42-C9CD-4801-B293-61D1F53EC57E}" type="datetimeFigureOut">
               <a:rPr lang="de-DE" smtClean="0"/>
-              <a:t>05.09.2017</a:t>
+              <a:t>06.09.2017</a:t>
             </a:fld>
             <a:endParaRPr lang="de-DE"/>
           </a:p>
@@ -7845,7 +7845,7 @@
           <a:p>
             <a:fld id="{1BA50D42-C9CD-4801-B293-61D1F53EC57E}" type="datetimeFigureOut">
               <a:rPr lang="de-DE" smtClean="0"/>
-              <a:t>05.09.2017</a:t>
+              <a:t>06.09.2017</a:t>
             </a:fld>
             <a:endParaRPr lang="de-DE"/>
           </a:p>
@@ -8262,7 +8262,7 @@
           <a:p>
             <a:fld id="{1BA50D42-C9CD-4801-B293-61D1F53EC57E}" type="datetimeFigureOut">
               <a:rPr lang="de-DE" smtClean="0"/>
-              <a:t>05.09.2017</a:t>
+              <a:t>06.09.2017</a:t>
             </a:fld>
             <a:endParaRPr lang="de-DE"/>
           </a:p>
@@ -8375,7 +8375,7 @@
           <a:p>
             <a:fld id="{1BA50D42-C9CD-4801-B293-61D1F53EC57E}" type="datetimeFigureOut">
               <a:rPr lang="de-DE" smtClean="0"/>
-              <a:t>05.09.2017</a:t>
+              <a:t>06.09.2017</a:t>
             </a:fld>
             <a:endParaRPr lang="de-DE"/>
           </a:p>
@@ -8465,7 +8465,7 @@
           <a:p>
             <a:fld id="{1BA50D42-C9CD-4801-B293-61D1F53EC57E}" type="datetimeFigureOut">
               <a:rPr lang="de-DE" smtClean="0"/>
-              <a:t>05.09.2017</a:t>
+              <a:t>06.09.2017</a:t>
             </a:fld>
             <a:endParaRPr lang="de-DE"/>
           </a:p>
@@ -8737,7 +8737,7 @@
           <a:p>
             <a:fld id="{1BA50D42-C9CD-4801-B293-61D1F53EC57E}" type="datetimeFigureOut">
               <a:rPr lang="de-DE" smtClean="0"/>
-              <a:t>05.09.2017</a:t>
+              <a:t>06.09.2017</a:t>
             </a:fld>
             <a:endParaRPr lang="de-DE"/>
           </a:p>
@@ -8985,7 +8985,7 @@
           <a:p>
             <a:fld id="{1BA50D42-C9CD-4801-B293-61D1F53EC57E}" type="datetimeFigureOut">
               <a:rPr lang="de-DE" smtClean="0"/>
-              <a:t>05.09.2017</a:t>
+              <a:t>06.09.2017</a:t>
             </a:fld>
             <a:endParaRPr lang="de-DE"/>
           </a:p>
@@ -9193,7 +9193,7 @@
           <a:p>
             <a:fld id="{1BA50D42-C9CD-4801-B293-61D1F53EC57E}" type="datetimeFigureOut">
               <a:rPr lang="de-DE" smtClean="0"/>
-              <a:t>05.09.2017</a:t>
+              <a:t>06.09.2017</a:t>
             </a:fld>
             <a:endParaRPr lang="de-DE"/>
           </a:p>
@@ -9565,21 +9565,21 @@
       </p:grpSpPr>
       <p:graphicFrame>
         <p:nvGraphicFramePr>
-          <p:cNvPr id="4" name="Chart 1"/>
+          <p:cNvPr id="3" name="Chart 1"/>
           <p:cNvGraphicFramePr>
             <a:graphicFrameLocks/>
           </p:cNvGraphicFramePr>
           <p:nvPr>
             <p:extLst>
               <p:ext uri="{D42A27DB-BD31-4B8C-83A1-F6EECF244321}">
-                <p14:modId xmlns:p14="http://schemas.microsoft.com/office/powerpoint/2010/main" val="3319728999"/>
+                <p14:modId xmlns:p14="http://schemas.microsoft.com/office/powerpoint/2010/main" val="2955922973"/>
               </p:ext>
             </p:extLst>
           </p:nvPr>
         </p:nvGraphicFramePr>
         <p:xfrm>
-          <a:off x="-137" y="0"/>
-          <a:ext cx="2880000" cy="2330451"/>
+          <a:off x="-3947" y="0"/>
+          <a:ext cx="2887620" cy="2330451"/>
         </p:xfrm>
         <a:graphic>
           <a:graphicData uri="http://schemas.openxmlformats.org/drawingml/2006/chart">

</xml_diff>

<commit_message>
Reworked section 4. Polishing and proofreading.
</commit_message>
<xml_diff>
--- a/img/classificationFrocFootball.pptx
+++ b/img/classificationFrocFootball.pptx
@@ -4612,15 +4612,15 @@
           <c:showPercent val="0"/>
           <c:showBubbleSize val="0"/>
         </c:dLbls>
-        <c:axId val="59807360"/>
-        <c:axId val="64242816"/>
+        <c:axId val="56413568"/>
+        <c:axId val="56410112"/>
       </c:scatterChart>
       <c:valAx>
-        <c:axId val="59807360"/>
+        <c:axId val="56413568"/>
         <c:scaling>
           <c:logBase val="10"/>
           <c:orientation val="minMax"/>
-          <c:max val="10"/>
+          <c:max val="30"/>
           <c:min val="1.0000000000000002E-2"/>
         </c:scaling>
         <c:delete val="0"/>
@@ -4710,12 +4710,12 @@
             <a:endParaRPr lang="de-DE"/>
           </a:p>
         </c:txPr>
-        <c:crossAx val="64242816"/>
+        <c:crossAx val="56410112"/>
         <c:crosses val="autoZero"/>
         <c:crossBetween val="midCat"/>
       </c:valAx>
       <c:valAx>
-        <c:axId val="64242816"/>
+        <c:axId val="56410112"/>
         <c:scaling>
           <c:orientation val="minMax"/>
           <c:max val="0.70000000000000007"/>
@@ -4792,7 +4792,7 @@
             <a:endParaRPr lang="de-DE"/>
           </a:p>
         </c:txPr>
-        <c:crossAx val="59807360"/>
+        <c:crossAx val="56413568"/>
         <c:crossesAt val="1.0000000000000002E-3"/>
         <c:crossBetween val="midCat"/>
       </c:valAx>
@@ -6394,11 +6394,11 @@
           <c:showPercent val="0"/>
           <c:showBubbleSize val="0"/>
         </c:dLbls>
-        <c:axId val="60200576"/>
-        <c:axId val="64241664"/>
+        <c:axId val="62648256"/>
+        <c:axId val="56411840"/>
       </c:scatterChart>
       <c:valAx>
-        <c:axId val="60200576"/>
+        <c:axId val="62648256"/>
         <c:scaling>
           <c:logBase val="10"/>
           <c:orientation val="minMax"/>
@@ -6485,12 +6485,12 @@
             <a:endParaRPr lang="de-DE"/>
           </a:p>
         </c:txPr>
-        <c:crossAx val="64241664"/>
+        <c:crossAx val="56411840"/>
         <c:crosses val="autoZero"/>
         <c:crossBetween val="midCat"/>
       </c:valAx>
       <c:valAx>
-        <c:axId val="64241664"/>
+        <c:axId val="56411840"/>
         <c:scaling>
           <c:orientation val="minMax"/>
           <c:max val="1"/>
@@ -6567,7 +6567,7 @@
             <a:endParaRPr lang="de-DE"/>
           </a:p>
         </c:txPr>
-        <c:crossAx val="60200576"/>
+        <c:crossAx val="62648256"/>
         <c:crossesAt val="1.0000000000000002E-3"/>
         <c:crossBetween val="midCat"/>
       </c:valAx>
@@ -6816,7 +6816,7 @@
           <a:p>
             <a:fld id="{1BA50D42-C9CD-4801-B293-61D1F53EC57E}" type="datetimeFigureOut">
               <a:rPr lang="de-DE" smtClean="0"/>
-              <a:t>06.09.2017</a:t>
+              <a:t>07.09.2017</a:t>
             </a:fld>
             <a:endParaRPr lang="de-DE"/>
           </a:p>
@@ -6981,7 +6981,7 @@
           <a:p>
             <a:fld id="{1BA50D42-C9CD-4801-B293-61D1F53EC57E}" type="datetimeFigureOut">
               <a:rPr lang="de-DE" smtClean="0"/>
-              <a:t>06.09.2017</a:t>
+              <a:t>07.09.2017</a:t>
             </a:fld>
             <a:endParaRPr lang="de-DE"/>
           </a:p>
@@ -7156,7 +7156,7 @@
           <a:p>
             <a:fld id="{1BA50D42-C9CD-4801-B293-61D1F53EC57E}" type="datetimeFigureOut">
               <a:rPr lang="de-DE" smtClean="0"/>
-              <a:t>06.09.2017</a:t>
+              <a:t>07.09.2017</a:t>
             </a:fld>
             <a:endParaRPr lang="de-DE"/>
           </a:p>
@@ -7321,7 +7321,7 @@
           <a:p>
             <a:fld id="{1BA50D42-C9CD-4801-B293-61D1F53EC57E}" type="datetimeFigureOut">
               <a:rPr lang="de-DE" smtClean="0"/>
-              <a:t>06.09.2017</a:t>
+              <a:t>07.09.2017</a:t>
             </a:fld>
             <a:endParaRPr lang="de-DE"/>
           </a:p>
@@ -7562,7 +7562,7 @@
           <a:p>
             <a:fld id="{1BA50D42-C9CD-4801-B293-61D1F53EC57E}" type="datetimeFigureOut">
               <a:rPr lang="de-DE" smtClean="0"/>
-              <a:t>06.09.2017</a:t>
+              <a:t>07.09.2017</a:t>
             </a:fld>
             <a:endParaRPr lang="de-DE"/>
           </a:p>
@@ -7845,7 +7845,7 @@
           <a:p>
             <a:fld id="{1BA50D42-C9CD-4801-B293-61D1F53EC57E}" type="datetimeFigureOut">
               <a:rPr lang="de-DE" smtClean="0"/>
-              <a:t>06.09.2017</a:t>
+              <a:t>07.09.2017</a:t>
             </a:fld>
             <a:endParaRPr lang="de-DE"/>
           </a:p>
@@ -8262,7 +8262,7 @@
           <a:p>
             <a:fld id="{1BA50D42-C9CD-4801-B293-61D1F53EC57E}" type="datetimeFigureOut">
               <a:rPr lang="de-DE" smtClean="0"/>
-              <a:t>06.09.2017</a:t>
+              <a:t>07.09.2017</a:t>
             </a:fld>
             <a:endParaRPr lang="de-DE"/>
           </a:p>
@@ -8375,7 +8375,7 @@
           <a:p>
             <a:fld id="{1BA50D42-C9CD-4801-B293-61D1F53EC57E}" type="datetimeFigureOut">
               <a:rPr lang="de-DE" smtClean="0"/>
-              <a:t>06.09.2017</a:t>
+              <a:t>07.09.2017</a:t>
             </a:fld>
             <a:endParaRPr lang="de-DE"/>
           </a:p>
@@ -8465,7 +8465,7 @@
           <a:p>
             <a:fld id="{1BA50D42-C9CD-4801-B293-61D1F53EC57E}" type="datetimeFigureOut">
               <a:rPr lang="de-DE" smtClean="0"/>
-              <a:t>06.09.2017</a:t>
+              <a:t>07.09.2017</a:t>
             </a:fld>
             <a:endParaRPr lang="de-DE"/>
           </a:p>
@@ -8737,7 +8737,7 @@
           <a:p>
             <a:fld id="{1BA50D42-C9CD-4801-B293-61D1F53EC57E}" type="datetimeFigureOut">
               <a:rPr lang="de-DE" smtClean="0"/>
-              <a:t>06.09.2017</a:t>
+              <a:t>07.09.2017</a:t>
             </a:fld>
             <a:endParaRPr lang="de-DE"/>
           </a:p>
@@ -8985,7 +8985,7 @@
           <a:p>
             <a:fld id="{1BA50D42-C9CD-4801-B293-61D1F53EC57E}" type="datetimeFigureOut">
               <a:rPr lang="de-DE" smtClean="0"/>
-              <a:t>06.09.2017</a:t>
+              <a:t>07.09.2017</a:t>
             </a:fld>
             <a:endParaRPr lang="de-DE"/>
           </a:p>
@@ -9193,7 +9193,7 @@
           <a:p>
             <a:fld id="{1BA50D42-C9CD-4801-B293-61D1F53EC57E}" type="datetimeFigureOut">
               <a:rPr lang="de-DE" smtClean="0"/>
-              <a:t>06.09.2017</a:t>
+              <a:t>07.09.2017</a:t>
             </a:fld>
             <a:endParaRPr lang="de-DE"/>
           </a:p>
@@ -9565,20 +9565,20 @@
       </p:grpSpPr>
       <p:graphicFrame>
         <p:nvGraphicFramePr>
-          <p:cNvPr id="3" name="Chart 1"/>
+          <p:cNvPr id="4" name="Chart 1"/>
           <p:cNvGraphicFramePr>
             <a:graphicFrameLocks/>
           </p:cNvGraphicFramePr>
           <p:nvPr>
             <p:extLst>
               <p:ext uri="{D42A27DB-BD31-4B8C-83A1-F6EECF244321}">
-                <p14:modId xmlns:p14="http://schemas.microsoft.com/office/powerpoint/2010/main" val="2955922973"/>
+                <p14:modId xmlns:p14="http://schemas.microsoft.com/office/powerpoint/2010/main" val="842341684"/>
               </p:ext>
             </p:extLst>
           </p:nvPr>
         </p:nvGraphicFramePr>
         <p:xfrm>
-          <a:off x="-3947" y="0"/>
+          <a:off x="-3947" y="3427"/>
           <a:ext cx="2887620" cy="2330451"/>
         </p:xfrm>
         <a:graphic>

</xml_diff>